<commit_message>
feat: Sistema BCB v2.0 - Estrutura modular completa
exit
Funcionalidades implementadas:
- ✅ Estrutura modular para trabalho em equipe
- ✅ Coleta robusta de 10 anos de dados históricos
- ✅ 12 indicadores econômicos do BCB
- ✅ 7 modelos de Machine Learning
- ✅ Sistema de relatórios com IA
- ✅ Configuração centralizada
- ✅ 5 módulos independentes

Versão: 2.0.0
</commit_message>
<xml_diff>
--- a/Projeto_Dados_Economicos.pptx
+++ b/Projeto_Dados_Economicos.pptx
@@ -317,7 +317,7 @@
           <a:p>
             <a:fld id="{5BCAD085-E8A6-8845-BD4E-CB4CCA059FC4}" type="datetimeFigureOut">
               <a:rPr lang="en-US" smtClean="0"/>
-              <a:t>4/22/25</a:t>
+              <a:t>5/28/25</a:t>
             </a:fld>
             <a:endParaRPr lang="en-US"/>
           </a:p>
@@ -485,7 +485,7 @@
           <a:p>
             <a:fld id="{5BCAD085-E8A6-8845-BD4E-CB4CCA059FC4}" type="datetimeFigureOut">
               <a:rPr lang="en-US" smtClean="0"/>
-              <a:t>4/22/25</a:t>
+              <a:t>5/28/25</a:t>
             </a:fld>
             <a:endParaRPr lang="en-US"/>
           </a:p>
@@ -663,7 +663,7 @@
           <a:p>
             <a:fld id="{5BCAD085-E8A6-8845-BD4E-CB4CCA059FC4}" type="datetimeFigureOut">
               <a:rPr lang="en-US" smtClean="0"/>
-              <a:t>4/22/25</a:t>
+              <a:t>5/28/25</a:t>
             </a:fld>
             <a:endParaRPr lang="en-US"/>
           </a:p>
@@ -831,7 +831,7 @@
           <a:p>
             <a:fld id="{5BCAD085-E8A6-8845-BD4E-CB4CCA059FC4}" type="datetimeFigureOut">
               <a:rPr lang="en-US" smtClean="0"/>
-              <a:t>4/22/25</a:t>
+              <a:t>5/28/25</a:t>
             </a:fld>
             <a:endParaRPr lang="en-US"/>
           </a:p>
@@ -1076,7 +1076,7 @@
           <a:p>
             <a:fld id="{5BCAD085-E8A6-8845-BD4E-CB4CCA059FC4}" type="datetimeFigureOut">
               <a:rPr lang="en-US" smtClean="0"/>
-              <a:t>4/22/25</a:t>
+              <a:t>5/28/25</a:t>
             </a:fld>
             <a:endParaRPr lang="en-US"/>
           </a:p>
@@ -1361,7 +1361,7 @@
           <a:p>
             <a:fld id="{5BCAD085-E8A6-8845-BD4E-CB4CCA059FC4}" type="datetimeFigureOut">
               <a:rPr lang="en-US" smtClean="0"/>
-              <a:t>4/22/25</a:t>
+              <a:t>5/28/25</a:t>
             </a:fld>
             <a:endParaRPr lang="en-US"/>
           </a:p>
@@ -1780,7 +1780,7 @@
           <a:p>
             <a:fld id="{5BCAD085-E8A6-8845-BD4E-CB4CCA059FC4}" type="datetimeFigureOut">
               <a:rPr lang="en-US" smtClean="0"/>
-              <a:t>4/22/25</a:t>
+              <a:t>5/28/25</a:t>
             </a:fld>
             <a:endParaRPr lang="en-US"/>
           </a:p>
@@ -1897,7 +1897,7 @@
           <a:p>
             <a:fld id="{5BCAD085-E8A6-8845-BD4E-CB4CCA059FC4}" type="datetimeFigureOut">
               <a:rPr lang="en-US" smtClean="0"/>
-              <a:t>4/22/25</a:t>
+              <a:t>5/28/25</a:t>
             </a:fld>
             <a:endParaRPr lang="en-US"/>
           </a:p>
@@ -1992,7 +1992,7 @@
           <a:p>
             <a:fld id="{5BCAD085-E8A6-8845-BD4E-CB4CCA059FC4}" type="datetimeFigureOut">
               <a:rPr lang="en-US" smtClean="0"/>
-              <a:t>4/22/25</a:t>
+              <a:t>5/28/25</a:t>
             </a:fld>
             <a:endParaRPr lang="en-US"/>
           </a:p>
@@ -2267,7 +2267,7 @@
           <a:p>
             <a:fld id="{5BCAD085-E8A6-8845-BD4E-CB4CCA059FC4}" type="datetimeFigureOut">
               <a:rPr lang="en-US" smtClean="0"/>
-              <a:t>4/22/25</a:t>
+              <a:t>5/28/25</a:t>
             </a:fld>
             <a:endParaRPr lang="en-US"/>
           </a:p>
@@ -2519,7 +2519,7 @@
           <a:p>
             <a:fld id="{5BCAD085-E8A6-8845-BD4E-CB4CCA059FC4}" type="datetimeFigureOut">
               <a:rPr lang="en-US" smtClean="0"/>
-              <a:t>4/22/25</a:t>
+              <a:t>5/28/25</a:t>
             </a:fld>
             <a:endParaRPr lang="en-US"/>
           </a:p>
@@ -2730,7 +2730,7 @@
           <a:p>
             <a:fld id="{5BCAD085-E8A6-8845-BD4E-CB4CCA059FC4}" type="datetimeFigureOut">
               <a:rPr lang="en-US" smtClean="0"/>
-              <a:t>4/22/25</a:t>
+              <a:t>5/28/25</a:t>
             </a:fld>
             <a:endParaRPr lang="en-US"/>
           </a:p>

</xml_diff>